<commit_message>
Updated code and PP
</commit_message>
<xml_diff>
--- a/Class 1/Introduction to Web Development_Lesson1.pptx
+++ b/Class 1/Introduction to Web Development_Lesson1.pptx
@@ -6,8 +6,11 @@
   </p:sldMasterIdLst>
   <p:sldIdLst>
     <p:sldId id="256" r:id="rId2"/>
-    <p:sldId id="258" r:id="rId3"/>
-    <p:sldId id="259" r:id="rId4"/>
+    <p:sldId id="262" r:id="rId3"/>
+    <p:sldId id="263" r:id="rId4"/>
+    <p:sldId id="259" r:id="rId5"/>
+    <p:sldId id="260" r:id="rId6"/>
+    <p:sldId id="261" r:id="rId7"/>
   </p:sldIdLst>
   <p:sldSz cx="12192000" cy="6858000"/>
   <p:notesSz cx="6858000" cy="9144000"/>
@@ -106,6 +109,11 @@
       </a:defRPr>
     </a:lvl9pPr>
   </p:defaultTextStyle>
+  <p:extLst>
+    <p:ext uri="{EFAFB233-063F-42B5-8137-9DF3F51BA10A}">
+      <p15:sldGuideLst xmlns:p15="http://schemas.microsoft.com/office/powerpoint/2012/main"/>
+    </p:ext>
+  </p:extLst>
 </p:presentation>
 </file>
 
@@ -335,7 +343,7 @@
           <a:p>
             <a:fld id="{4BDF68E2-58F2-4D09-BE8B-E3BD06533059}" type="datetimeFigureOut">
               <a:rPr lang="en-US" dirty="0"/>
-              <a:t>11/11/2014</a:t>
+              <a:t>1/13/2015</a:t>
             </a:fld>
             <a:endParaRPr lang="en-US" dirty="0"/>
           </a:p>
@@ -538,7 +546,7 @@
           <a:p>
             <a:fld id="{2E2D6473-DF6D-4702-B328-E0DD40540A4E}" type="datetimeFigureOut">
               <a:rPr lang="en-US" dirty="0"/>
-              <a:t>11/11/2014</a:t>
+              <a:t>1/13/2015</a:t>
             </a:fld>
             <a:endParaRPr lang="en-US" dirty="0"/>
           </a:p>
@@ -789,7 +797,7 @@
           <a:p>
             <a:fld id="{E26F7E3A-B166-407D-9866-32884E7D5B37}" type="datetimeFigureOut">
               <a:rPr lang="en-US" dirty="0"/>
-              <a:t>11/11/2014</a:t>
+              <a:t>1/13/2015</a:t>
             </a:fld>
             <a:endParaRPr lang="en-US" dirty="0"/>
           </a:p>
@@ -958,7 +966,7 @@
           <a:p>
             <a:fld id="{528FC5F6-F338-4AE4-BB23-26385BCFC423}" type="datetimeFigureOut">
               <a:rPr lang="en-US" dirty="0"/>
-              <a:t>11/11/2014</a:t>
+              <a:t>1/13/2015</a:t>
             </a:fld>
             <a:endParaRPr lang="en-US" dirty="0"/>
           </a:p>
@@ -1296,7 +1304,7 @@
           <a:p>
             <a:fld id="{20EBB0C4-6273-4C6E-B9BD-2EDC30F1CD52}" type="datetimeFigureOut">
               <a:rPr lang="en-US" dirty="0"/>
-              <a:t>11/11/2014</a:t>
+              <a:t>1/13/2015</a:t>
             </a:fld>
             <a:endParaRPr lang="en-US" dirty="0"/>
           </a:p>
@@ -1566,7 +1574,7 @@
           <a:p>
             <a:fld id="{19AB4D41-86C1-4908-B66A-0B50CEB3BF29}" type="datetimeFigureOut">
               <a:rPr lang="en-US" dirty="0"/>
-              <a:t>11/11/2014</a:t>
+              <a:t>1/13/2015</a:t>
             </a:fld>
             <a:endParaRPr lang="en-US" dirty="0"/>
           </a:p>
@@ -1940,7 +1948,7 @@
           <a:p>
             <a:fld id="{E6426E2C-56C1-4E0D-A793-0088A7FDD37E}" type="datetimeFigureOut">
               <a:rPr lang="en-US" dirty="0"/>
-              <a:t>11/11/2014</a:t>
+              <a:t>1/13/2015</a:t>
             </a:fld>
             <a:endParaRPr lang="en-US" dirty="0"/>
           </a:p>
@@ -2053,7 +2061,7 @@
           <a:p>
             <a:fld id="{C8C39B41-D8B5-4052-B551-9B5525EAA8B6}" type="datetimeFigureOut">
               <a:rPr lang="en-US" dirty="0"/>
-              <a:t>11/11/2014</a:t>
+              <a:t>1/13/2015</a:t>
             </a:fld>
             <a:endParaRPr lang="en-US" dirty="0"/>
           </a:p>
@@ -2219,7 +2227,7 @@
           <a:p>
             <a:fld id="{4D94136C-8742-45B2-AF27-D93DF72833A9}" type="datetimeFigureOut">
               <a:rPr lang="en-US" dirty="0"/>
-              <a:t>11/11/2014</a:t>
+              <a:t>1/13/2015</a:t>
             </a:fld>
             <a:endParaRPr lang="en-US" dirty="0"/>
           </a:p>
@@ -2569,7 +2577,7 @@
           <a:p>
             <a:fld id="{32ABBEA6-7C60-4B02-AE87-00D78D8422AF}" type="datetimeFigureOut">
               <a:rPr lang="en-US" dirty="0"/>
-              <a:t>11/11/2014</a:t>
+              <a:t>1/13/2015</a:t>
             </a:fld>
             <a:endParaRPr lang="en-US" dirty="0"/>
           </a:p>
@@ -2947,7 +2955,7 @@
           <a:p>
             <a:fld id="{C9CAD897-D46E-4AD2-BD9B-49DD3E640873}" type="datetimeFigureOut">
               <a:rPr lang="en-US" dirty="0"/>
-              <a:t>11/11/2014</a:t>
+              <a:t>1/13/2015</a:t>
             </a:fld>
             <a:endParaRPr lang="en-US" dirty="0"/>
           </a:p>
@@ -3229,7 +3237,7 @@
           <a:p>
             <a:fld id="{98624D31-43A5-475A-80CF-332C9F6DCF35}" type="datetimeFigureOut">
               <a:rPr lang="en-US" dirty="0"/>
-              <a:t>11/11/2014</a:t>
+              <a:t>1/13/2015</a:t>
             </a:fld>
             <a:endParaRPr lang="en-US" dirty="0"/>
           </a:p>
@@ -3806,6 +3814,13 @@
   <p:clrMapOvr>
     <a:masterClrMapping/>
   </p:clrMapOvr>
+  <p:timing>
+    <p:tnLst>
+      <p:par>
+        <p:cTn id="1" dur="indefinite" restart="never" nodeType="tmRoot"/>
+      </p:par>
+    </p:tnLst>
+  </p:timing>
 </p:sld>
 </file>
 
@@ -3838,14 +3853,24 @@
         </p:nvSpPr>
         <p:spPr/>
         <p:txBody>
-          <a:bodyPr/>
-          <a:lstStyle/>
-          <a:p>
-            <a:r>
-              <a:rPr lang="en-US" dirty="0" smtClean="0"/>
-              <a:t>What this class is about</a:t>
-            </a:r>
-            <a:endParaRPr lang="en-US" dirty="0"/>
+          <a:bodyPr>
+            <a:normAutofit/>
+          </a:bodyPr>
+          <a:lstStyle/>
+          <a:p>
+            <a:r>
+              <a:rPr lang="en-US" sz="4400" dirty="0" smtClean="0"/>
+              <a:t>What Intro to Web Development is </a:t>
+            </a:r>
+            <a:r>
+              <a:rPr lang="en-US" sz="4400" dirty="0"/>
+              <a:t>A</a:t>
+            </a:r>
+            <a:r>
+              <a:rPr lang="en-US" sz="4400" dirty="0" smtClean="0"/>
+              <a:t>ll About</a:t>
+            </a:r>
+            <a:endParaRPr lang="en-US" sz="4400" dirty="0"/>
           </a:p>
         </p:txBody>
       </p:sp>
@@ -3861,43 +3886,58 @@
         </p:nvSpPr>
         <p:spPr/>
         <p:txBody>
-          <a:bodyPr/>
-          <a:lstStyle/>
-          <a:p>
-            <a:r>
-              <a:rPr lang="en-US" dirty="0" smtClean="0"/>
-              <a:t>Introduction to some of the basic concepts of web development.</a:t>
-            </a:r>
-          </a:p>
-          <a:p>
-            <a:endParaRPr lang="en-US" dirty="0"/>
-          </a:p>
-          <a:p>
-            <a:endParaRPr lang="en-US" dirty="0" smtClean="0"/>
-          </a:p>
-          <a:p>
-            <a:r>
-              <a:rPr lang="en-US" dirty="0" err="1" smtClean="0"/>
-              <a:t>Ect</a:t>
-            </a:r>
-            <a:r>
-              <a:rPr lang="en-US" dirty="0" smtClean="0"/>
-              <a:t> </a:t>
-            </a:r>
-          </a:p>
-          <a:p>
-            <a:r>
-              <a:rPr lang="en-US" dirty="0" err="1" smtClean="0"/>
-              <a:t>Ect</a:t>
-            </a:r>
-            <a:endParaRPr lang="en-US" dirty="0" smtClean="0"/>
-          </a:p>
-          <a:p>
-            <a:r>
-              <a:rPr lang="en-US" dirty="0" err="1" smtClean="0"/>
-              <a:t>Ect</a:t>
-            </a:r>
-            <a:endParaRPr lang="en-US" dirty="0" smtClean="0"/>
+          <a:bodyPr>
+            <a:normAutofit lnSpcReduction="10000"/>
+          </a:bodyPr>
+          <a:lstStyle/>
+          <a:p>
+            <a:r>
+              <a:rPr lang="en-US" sz="2800" dirty="0" smtClean="0"/>
+              <a:t>Intro to web development is about introducing you to some of the concepts and tools you’ll be using to create and publish simple websites to the internet.</a:t>
+            </a:r>
+          </a:p>
+          <a:p>
+            <a:r>
+              <a:rPr lang="en-US" sz="2800" dirty="0" smtClean="0"/>
+              <a:t>Some of the tools you will use are:</a:t>
+            </a:r>
+          </a:p>
+          <a:p>
+            <a:pPr lvl="1"/>
+            <a:r>
+              <a:rPr lang="en-US" sz="2400" dirty="0" smtClean="0"/>
+              <a:t>FTP clients – uses a internet protocol to transmit data back and forth across the internet</a:t>
+            </a:r>
+          </a:p>
+          <a:p>
+            <a:pPr lvl="1"/>
+            <a:r>
+              <a:rPr lang="en-US" sz="2400" dirty="0" smtClean="0"/>
+              <a:t>Web Browsers – use html markup, </a:t>
+            </a:r>
+            <a:r>
+              <a:rPr lang="en-US" sz="2400" dirty="0" err="1" smtClean="0"/>
+              <a:t>css</a:t>
+            </a:r>
+            <a:r>
+              <a:rPr lang="en-US" sz="2400" dirty="0" smtClean="0"/>
+              <a:t> (cascading style sheets), and </a:t>
+            </a:r>
+            <a:r>
+              <a:rPr lang="en-US" sz="2400" dirty="0" err="1" smtClean="0"/>
+              <a:t>javascript</a:t>
+            </a:r>
+            <a:r>
+              <a:rPr lang="en-US" sz="2400" dirty="0" smtClean="0"/>
+              <a:t> to display web pages.</a:t>
+            </a:r>
+          </a:p>
+          <a:p>
+            <a:pPr lvl="1"/>
+            <a:r>
+              <a:rPr lang="en-US" sz="2400" dirty="0" smtClean="0"/>
+              <a:t>Text Editors/IDE (integrated development environment) – used to help make code readable and simplify common task while producing your code.</a:t>
+            </a:r>
           </a:p>
           <a:p>
             <a:endParaRPr lang="en-US" dirty="0"/>
@@ -3907,13 +3947,20 @@
     </p:spTree>
     <p:extLst>
       <p:ext uri="{BB962C8B-B14F-4D97-AF65-F5344CB8AC3E}">
-        <p14:creationId xmlns:p14="http://schemas.microsoft.com/office/powerpoint/2010/main" val="808714121"/>
+        <p14:creationId xmlns:p14="http://schemas.microsoft.com/office/powerpoint/2010/main" val="1027316283"/>
       </p:ext>
     </p:extLst>
   </p:cSld>
   <p:clrMapOvr>
     <a:masterClrMapping/>
   </p:clrMapOvr>
+  <p:timing>
+    <p:tnLst>
+      <p:par>
+        <p:cTn id="1" dur="indefinite" restart="never" nodeType="tmRoot"/>
+      </p:par>
+    </p:tnLst>
+  </p:timing>
 </p:sld>
 </file>
 
@@ -3946,18 +3993,182 @@
         </p:nvSpPr>
         <p:spPr/>
         <p:txBody>
-          <a:bodyPr/>
-          <a:lstStyle/>
-          <a:p>
-            <a:r>
-              <a:rPr lang="en-US" dirty="0" err="1" smtClean="0"/>
-              <a:t>Stucture</a:t>
+          <a:bodyPr>
+            <a:normAutofit/>
+          </a:bodyPr>
+          <a:lstStyle/>
+          <a:p>
+            <a:r>
+              <a:rPr lang="en-US" sz="3800" dirty="0"/>
+              <a:t>What Intro to Web Development is All </a:t>
+            </a:r>
+            <a:r>
+              <a:rPr lang="en-US" sz="3800" dirty="0" smtClean="0"/>
+              <a:t>About </a:t>
+            </a:r>
+            <a:r>
+              <a:rPr lang="en-US" sz="3800" dirty="0" err="1" smtClean="0"/>
+              <a:t>cont</a:t>
+            </a:r>
+            <a:r>
+              <a:rPr lang="en-US" sz="3800" dirty="0" smtClean="0"/>
+              <a:t>…</a:t>
+            </a:r>
+            <a:endParaRPr lang="en-US" sz="3800" dirty="0"/>
+          </a:p>
+        </p:txBody>
+      </p:sp>
+      <p:sp>
+        <p:nvSpPr>
+          <p:cNvPr id="3" name="Content Placeholder 2"/>
+          <p:cNvSpPr>
+            <a:spLocks noGrp="1"/>
+          </p:cNvSpPr>
+          <p:nvPr>
+            <p:ph idx="1"/>
+          </p:nvPr>
+        </p:nvSpPr>
+        <p:spPr/>
+        <p:txBody>
+          <a:bodyPr/>
+          <a:lstStyle/>
+          <a:p>
+            <a:r>
+              <a:rPr lang="en-US" dirty="0"/>
+              <a:t>Some of the concepts we will cover are:</a:t>
+            </a:r>
+          </a:p>
+          <a:p>
+            <a:pPr lvl="1"/>
+            <a:r>
+              <a:rPr lang="en-US" dirty="0"/>
+              <a:t>Best Practice – a term used to set coding standards and conventions.  Helps developers understand one another.</a:t>
+            </a:r>
+          </a:p>
+          <a:p>
+            <a:pPr lvl="1"/>
+            <a:r>
+              <a:rPr lang="en-US" dirty="0"/>
+              <a:t>DOM – Document Object Model - The Document Object Model is a platform- and language-neutral interface that will allow programs and scripts to dynamically access and update the content, structure and style of documents. The document can be further processed and the results of that processing can be incorporated back into the presented page. This is an overview of DOM-related materials here at W3C and around the web.</a:t>
+            </a:r>
+          </a:p>
+          <a:p>
+            <a:pPr lvl="2"/>
+            <a:r>
+              <a:rPr lang="en-US" dirty="0">
+                <a:hlinkClick r:id="rId2"/>
+              </a:rPr>
+              <a:t>http://www.w3.org/DOM/</a:t>
+            </a:r>
+            <a:endParaRPr lang="en-US" dirty="0"/>
+          </a:p>
+          <a:p>
+            <a:pPr lvl="1"/>
+            <a:r>
+              <a:rPr lang="en-US" dirty="0"/>
+              <a:t>HTML – Hyper Text Markup Language - is the standard </a:t>
             </a:r>
             <a:r>
               <a:rPr lang="en-US" dirty="0" smtClean="0"/>
-              <a:t> Elements</a:t>
-            </a:r>
-            <a:endParaRPr lang="en-US" dirty="0"/>
+              <a:t>language used </a:t>
+            </a:r>
+            <a:r>
+              <a:rPr lang="en-US" dirty="0"/>
+              <a:t>to create </a:t>
+            </a:r>
+            <a:r>
+              <a:rPr lang="en-US" dirty="0" smtClean="0"/>
+              <a:t>web pages.</a:t>
+            </a:r>
+          </a:p>
+          <a:p>
+            <a:pPr lvl="1"/>
+            <a:r>
+              <a:rPr lang="en-US" dirty="0" smtClean="0"/>
+              <a:t>CSS – Cascading Style Sheets – </a:t>
+            </a:r>
+            <a:r>
+              <a:rPr lang="en-US" dirty="0"/>
+              <a:t>A cascading style sheet (CSS) is a Web page derived from multiple sources with a defined order of precedence where the definitions of any style element conflict.</a:t>
+            </a:r>
+            <a:endParaRPr lang="en-US" dirty="0" smtClean="0"/>
+          </a:p>
+          <a:p>
+            <a:pPr lvl="1"/>
+            <a:r>
+              <a:rPr lang="en-US" dirty="0" smtClean="0"/>
+              <a:t>JavaScript - </a:t>
+            </a:r>
+            <a:r>
+              <a:rPr lang="en-US" dirty="0"/>
+              <a:t>an object-oriented computer programming language commonly used to create interactive effects within web browsers.</a:t>
+            </a:r>
+          </a:p>
+          <a:p>
+            <a:pPr lvl="1"/>
+            <a:endParaRPr lang="en-US" dirty="0"/>
+          </a:p>
+          <a:p>
+            <a:endParaRPr lang="en-US" dirty="0"/>
+          </a:p>
+        </p:txBody>
+      </p:sp>
+    </p:spTree>
+    <p:extLst>
+      <p:ext uri="{BB962C8B-B14F-4D97-AF65-F5344CB8AC3E}">
+        <p14:creationId xmlns:p14="http://schemas.microsoft.com/office/powerpoint/2010/main" val="2205297288"/>
+      </p:ext>
+    </p:extLst>
+  </p:cSld>
+  <p:clrMapOvr>
+    <a:masterClrMapping/>
+  </p:clrMapOvr>
+</p:sld>
+</file>
+
+<file path=ppt/slides/slide4.xml><?xml version="1.0" encoding="utf-8"?>
+<p:sld xmlns:a="http://schemas.openxmlformats.org/drawingml/2006/main" xmlns:r="http://schemas.openxmlformats.org/officeDocument/2006/relationships" xmlns:p="http://schemas.openxmlformats.org/presentationml/2006/main">
+  <p:cSld>
+    <p:spTree>
+      <p:nvGrpSpPr>
+        <p:cNvPr id="1" name=""/>
+        <p:cNvGrpSpPr/>
+        <p:nvPr/>
+      </p:nvGrpSpPr>
+      <p:grpSpPr>
+        <a:xfrm>
+          <a:off x="0" y="0"/>
+          <a:ext cx="0" cy="0"/>
+          <a:chOff x="0" y="0"/>
+          <a:chExt cx="0" cy="0"/>
+        </a:xfrm>
+      </p:grpSpPr>
+      <p:sp>
+        <p:nvSpPr>
+          <p:cNvPr id="2" name="Title 1"/>
+          <p:cNvSpPr>
+            <a:spLocks noGrp="1"/>
+          </p:cNvSpPr>
+          <p:nvPr>
+            <p:ph type="title"/>
+          </p:nvPr>
+        </p:nvSpPr>
+        <p:spPr/>
+        <p:txBody>
+          <a:bodyPr>
+            <a:normAutofit/>
+          </a:bodyPr>
+          <a:lstStyle/>
+          <a:p>
+            <a:r>
+              <a:rPr lang="en-US" sz="4600" dirty="0" smtClean="0"/>
+              <a:t>Structure </a:t>
+            </a:r>
+            <a:r>
+              <a:rPr lang="en-US" sz="4600" dirty="0" smtClean="0"/>
+              <a:t>Elements (HTML5 Semantic Tags)</a:t>
+            </a:r>
+            <a:endParaRPr lang="en-US" sz="4600" dirty="0"/>
           </a:p>
         </p:txBody>
       </p:sp>
@@ -3973,109 +4184,80 @@
         </p:nvSpPr>
         <p:spPr/>
         <p:txBody>
-          <a:bodyPr/>
-          <a:lstStyle/>
-          <a:p>
-            <a:pPr algn="ctr"/>
-            <a:r>
-              <a:rPr lang="en-US" b="1" u="sng" dirty="0"/>
-              <a:t>Html 5 structure tags</a:t>
-            </a:r>
-          </a:p>
-          <a:p>
-            <a:pPr>
-              <a:buFont typeface="Wingdings" panose="05000000000000000000" pitchFamily="2" charset="2"/>
-              <a:buChar char="§"/>
-            </a:pPr>
-            <a:r>
-              <a:rPr lang="en-US" dirty="0"/>
-              <a:t>Section &lt;section&gt;&lt;/section&gt; - used to structure a document into sections.</a:t>
-            </a:r>
-          </a:p>
-          <a:p>
-            <a:pPr>
-              <a:buFont typeface="Wingdings" panose="05000000000000000000" pitchFamily="2" charset="2"/>
-              <a:buChar char="§"/>
-            </a:pPr>
-            <a:r>
-              <a:rPr lang="en-US" dirty="0"/>
-              <a:t>Header &lt;header&gt;&lt;/header&gt; - used to add header elements to document body, and it’s used to apply headings to sections and articles.</a:t>
-            </a:r>
-          </a:p>
-          <a:p>
-            <a:pPr>
-              <a:buFont typeface="Wingdings" panose="05000000000000000000" pitchFamily="2" charset="2"/>
-              <a:buChar char="§"/>
-            </a:pPr>
-            <a:r>
-              <a:rPr lang="en-US" dirty="0"/>
-              <a:t>Article &lt;article&gt;&lt;/article&gt; - used to separate content within sections into topics</a:t>
-            </a:r>
-          </a:p>
-          <a:p>
-            <a:pPr>
-              <a:buFont typeface="Wingdings" panose="05000000000000000000" pitchFamily="2" charset="2"/>
-              <a:buChar char="§"/>
-            </a:pPr>
-            <a:r>
-              <a:rPr lang="en-US" dirty="0" err="1"/>
+          <a:bodyPr>
+            <a:normAutofit/>
+          </a:bodyPr>
+          <a:lstStyle/>
+          <a:p>
+            <a:r>
+              <a:rPr lang="en-US" sz="2800" dirty="0" smtClean="0"/>
+              <a:t>Html </a:t>
+            </a:r>
+            <a:r>
+              <a:rPr lang="en-US" sz="2800" dirty="0"/>
+              <a:t>5 structure tags</a:t>
+            </a:r>
+          </a:p>
+          <a:p>
+            <a:pPr lvl="1"/>
+            <a:r>
+              <a:rPr lang="en-US" sz="2400" dirty="0"/>
+              <a:t>Section &lt;section&gt;&lt;/section&gt; - defines sections in a document, such as chapters, headers, footers, or any other sections of the document.</a:t>
+            </a:r>
+          </a:p>
+          <a:p>
+            <a:pPr lvl="1"/>
+            <a:r>
+              <a:rPr lang="en-US" sz="2400" dirty="0"/>
+              <a:t>Header &lt;header&gt;&lt;/header&gt; - represents a container for introductory content or a set of navigational links.</a:t>
+            </a:r>
+          </a:p>
+          <a:p>
+            <a:pPr lvl="1"/>
+            <a:r>
+              <a:rPr lang="en-US" sz="2400" dirty="0"/>
+              <a:t>Article &lt;article&gt;&lt;/article&gt; - specifies independent, self-contained content.</a:t>
+            </a:r>
+          </a:p>
+          <a:p>
+            <a:pPr lvl="1"/>
+            <a:r>
+              <a:rPr lang="en-US" sz="2400" dirty="0" err="1"/>
               <a:t>Nav</a:t>
             </a:r>
             <a:r>
-              <a:rPr lang="en-US" dirty="0"/>
+              <a:rPr lang="en-US" sz="2400" dirty="0"/>
               <a:t> &lt;</a:t>
             </a:r>
             <a:r>
-              <a:rPr lang="en-US" dirty="0" err="1"/>
+              <a:rPr lang="en-US" sz="2400" dirty="0" err="1"/>
               <a:t>nav</a:t>
             </a:r>
             <a:r>
-              <a:rPr lang="en-US" dirty="0"/>
+              <a:rPr lang="en-US" sz="2400" dirty="0"/>
               <a:t>&gt;&lt;/</a:t>
             </a:r>
             <a:r>
-              <a:rPr lang="en-US" dirty="0" err="1"/>
+              <a:rPr lang="en-US" sz="2400" dirty="0" err="1"/>
               <a:t>nav</a:t>
             </a:r>
             <a:r>
-              <a:rPr lang="en-US" dirty="0"/>
-              <a:t>&gt; - used to encapsulate the </a:t>
-            </a:r>
-            <a:r>
-              <a:rPr lang="en-US" dirty="0" err="1"/>
-              <a:t>nav</a:t>
-            </a:r>
-            <a:r>
-              <a:rPr lang="en-US" dirty="0"/>
-              <a:t> elements of a page</a:t>
-            </a:r>
-          </a:p>
-          <a:p>
-            <a:pPr>
-              <a:buFont typeface="Wingdings" panose="05000000000000000000" pitchFamily="2" charset="2"/>
-              <a:buChar char="§"/>
-            </a:pPr>
-            <a:r>
-              <a:rPr lang="en-US" dirty="0"/>
-              <a:t>Footer &lt;footer&gt;&lt;/footer&gt; - used to encapsulate the footer elements of a page</a:t>
-            </a:r>
-          </a:p>
-          <a:p>
-            <a:pPr>
-              <a:buFont typeface="Wingdings" panose="05000000000000000000" pitchFamily="2" charset="2"/>
-              <a:buChar char="§"/>
-            </a:pPr>
-            <a:r>
-              <a:rPr lang="en-US" dirty="0"/>
-              <a:t>Aside &lt;aside&gt;&lt;/aside&gt; - can be used inside of sections or articles with content that is closely related, or inside of the body of a web page if content is </a:t>
-            </a:r>
-            <a:r>
-              <a:rPr lang="en-US" dirty="0" err="1"/>
-              <a:t>closesly</a:t>
-            </a:r>
-            <a:r>
-              <a:rPr lang="en-US" dirty="0"/>
-              <a:t> related to entire page.</a:t>
+              <a:rPr lang="en-US" sz="2400" dirty="0"/>
+              <a:t>&gt; - defines a set of navigation links.</a:t>
+            </a:r>
+          </a:p>
+          <a:p>
+            <a:pPr lvl="1"/>
+            <a:r>
+              <a:rPr lang="en-US" sz="2400" dirty="0"/>
+              <a:t>Footer &lt;footer&gt;&lt;/footer&gt; - defines a footer for a document or section.</a:t>
+            </a:r>
+          </a:p>
+          <a:p>
+            <a:pPr lvl="1"/>
+            <a:r>
+              <a:rPr lang="en-US" sz="2400" dirty="0"/>
+              <a:t>Aside &lt;aside&gt;&lt;/aside&gt; - defines some content aside from the content it is placed in.</a:t>
             </a:r>
           </a:p>
           <a:p>
@@ -4087,6 +4269,279 @@
     <p:extLst>
       <p:ext uri="{BB962C8B-B14F-4D97-AF65-F5344CB8AC3E}">
         <p14:creationId xmlns:p14="http://schemas.microsoft.com/office/powerpoint/2010/main" val="729013234"/>
+      </p:ext>
+    </p:extLst>
+  </p:cSld>
+  <p:clrMapOvr>
+    <a:masterClrMapping/>
+  </p:clrMapOvr>
+</p:sld>
+</file>
+
+<file path=ppt/slides/slide5.xml><?xml version="1.0" encoding="utf-8"?>
+<p:sld xmlns:a="http://schemas.openxmlformats.org/drawingml/2006/main" xmlns:r="http://schemas.openxmlformats.org/officeDocument/2006/relationships" xmlns:p="http://schemas.openxmlformats.org/presentationml/2006/main">
+  <p:cSld>
+    <p:spTree>
+      <p:nvGrpSpPr>
+        <p:cNvPr id="1" name=""/>
+        <p:cNvGrpSpPr/>
+        <p:nvPr/>
+      </p:nvGrpSpPr>
+      <p:grpSpPr>
+        <a:xfrm>
+          <a:off x="0" y="0"/>
+          <a:ext cx="0" cy="0"/>
+          <a:chOff x="0" y="0"/>
+          <a:chExt cx="0" cy="0"/>
+        </a:xfrm>
+      </p:grpSpPr>
+      <p:sp>
+        <p:nvSpPr>
+          <p:cNvPr id="2" name="Title 1"/>
+          <p:cNvSpPr>
+            <a:spLocks noGrp="1"/>
+          </p:cNvSpPr>
+          <p:nvPr>
+            <p:ph type="title"/>
+          </p:nvPr>
+        </p:nvSpPr>
+        <p:spPr/>
+        <p:txBody>
+          <a:bodyPr/>
+          <a:lstStyle/>
+          <a:p>
+            <a:r>
+              <a:rPr lang="en-US" dirty="0"/>
+              <a:t>Html Block </a:t>
+            </a:r>
+            <a:r>
+              <a:rPr lang="en-US" dirty="0" smtClean="0"/>
+              <a:t>Elements</a:t>
+            </a:r>
+            <a:endParaRPr lang="en-US" dirty="0"/>
+          </a:p>
+        </p:txBody>
+      </p:sp>
+      <p:sp>
+        <p:nvSpPr>
+          <p:cNvPr id="3" name="Content Placeholder 2"/>
+          <p:cNvSpPr>
+            <a:spLocks noGrp="1"/>
+          </p:cNvSpPr>
+          <p:nvPr>
+            <p:ph idx="1"/>
+          </p:nvPr>
+        </p:nvSpPr>
+        <p:spPr/>
+        <p:txBody>
+          <a:bodyPr/>
+          <a:lstStyle/>
+          <a:p>
+            <a:pPr lvl="1"/>
+            <a:r>
+              <a:rPr lang="en-US" sz="3200" dirty="0" smtClean="0"/>
+              <a:t>Paragraph </a:t>
+            </a:r>
+            <a:r>
+              <a:rPr lang="en-US" sz="3200" dirty="0"/>
+              <a:t>&lt;p&gt;&lt;/p&gt; - defines a paragraph.</a:t>
+            </a:r>
+          </a:p>
+          <a:p>
+            <a:pPr lvl="1"/>
+            <a:r>
+              <a:rPr lang="en-US" sz="3200" dirty="0"/>
+              <a:t>H &lt;h?&gt;&lt;/h?&gt; - (&lt;h1&gt; to &lt;h6&gt; tags) - are used to define HTML headings.</a:t>
+            </a:r>
+          </a:p>
+          <a:p>
+            <a:pPr lvl="1"/>
+            <a:r>
+              <a:rPr lang="en-US" sz="3200" dirty="0"/>
+              <a:t>Line breaks &lt;</a:t>
+            </a:r>
+            <a:r>
+              <a:rPr lang="en-US" sz="3200" dirty="0" err="1"/>
+              <a:t>br</a:t>
+            </a:r>
+            <a:r>
+              <a:rPr lang="en-US" sz="3200" dirty="0"/>
+              <a:t> /&gt; - inserts a single line break. </a:t>
+            </a:r>
+          </a:p>
+          <a:p>
+            <a:pPr lvl="1"/>
+            <a:r>
+              <a:rPr lang="en-US" sz="3200" dirty="0"/>
+              <a:t>Horizontal break &lt;</a:t>
+            </a:r>
+            <a:r>
+              <a:rPr lang="en-US" sz="3200" dirty="0" err="1"/>
+              <a:t>hr</a:t>
+            </a:r>
+            <a:r>
+              <a:rPr lang="en-US" sz="3200" dirty="0"/>
+              <a:t> /&gt; - defines a thematic break in an HTML page</a:t>
+            </a:r>
+            <a:r>
+              <a:rPr lang="en-US" sz="2000" dirty="0"/>
+              <a:t>. </a:t>
+            </a:r>
+          </a:p>
+          <a:p>
+            <a:endParaRPr lang="en-US" dirty="0"/>
+          </a:p>
+        </p:txBody>
+      </p:sp>
+    </p:spTree>
+    <p:extLst>
+      <p:ext uri="{BB962C8B-B14F-4D97-AF65-F5344CB8AC3E}">
+        <p14:creationId xmlns:p14="http://schemas.microsoft.com/office/powerpoint/2010/main" val="3850787189"/>
+      </p:ext>
+    </p:extLst>
+  </p:cSld>
+  <p:clrMapOvr>
+    <a:masterClrMapping/>
+  </p:clrMapOvr>
+</p:sld>
+</file>
+
+<file path=ppt/slides/slide6.xml><?xml version="1.0" encoding="utf-8"?>
+<p:sld xmlns:a="http://schemas.openxmlformats.org/drawingml/2006/main" xmlns:r="http://schemas.openxmlformats.org/officeDocument/2006/relationships" xmlns:p="http://schemas.openxmlformats.org/presentationml/2006/main">
+  <p:cSld>
+    <p:spTree>
+      <p:nvGrpSpPr>
+        <p:cNvPr id="1" name=""/>
+        <p:cNvGrpSpPr/>
+        <p:nvPr/>
+      </p:nvGrpSpPr>
+      <p:grpSpPr>
+        <a:xfrm>
+          <a:off x="0" y="0"/>
+          <a:ext cx="0" cy="0"/>
+          <a:chOff x="0" y="0"/>
+          <a:chExt cx="0" cy="0"/>
+        </a:xfrm>
+      </p:grpSpPr>
+      <p:sp>
+        <p:nvSpPr>
+          <p:cNvPr id="2" name="Title 1"/>
+          <p:cNvSpPr>
+            <a:spLocks noGrp="1"/>
+          </p:cNvSpPr>
+          <p:nvPr>
+            <p:ph type="title"/>
+          </p:nvPr>
+        </p:nvSpPr>
+        <p:spPr/>
+        <p:txBody>
+          <a:bodyPr/>
+          <a:lstStyle/>
+          <a:p>
+            <a:r>
+              <a:rPr lang="en-US" dirty="0" smtClean="0"/>
+              <a:t>Inline Elements and Common Attributes</a:t>
+            </a:r>
+            <a:endParaRPr lang="en-US" dirty="0"/>
+          </a:p>
+        </p:txBody>
+      </p:sp>
+      <p:sp>
+        <p:nvSpPr>
+          <p:cNvPr id="3" name="Content Placeholder 2"/>
+          <p:cNvSpPr>
+            <a:spLocks noGrp="1"/>
+          </p:cNvSpPr>
+          <p:nvPr>
+            <p:ph idx="1"/>
+          </p:nvPr>
+        </p:nvSpPr>
+        <p:spPr/>
+        <p:txBody>
+          <a:bodyPr>
+            <a:normAutofit lnSpcReduction="10000"/>
+          </a:bodyPr>
+          <a:lstStyle/>
+          <a:p>
+            <a:r>
+              <a:rPr lang="en-US" sz="3200" dirty="0"/>
+              <a:t>Inline Elements</a:t>
+            </a:r>
+          </a:p>
+          <a:p>
+            <a:pPr lvl="1"/>
+            <a:r>
+              <a:rPr lang="en-US" sz="2800" dirty="0" err="1"/>
+              <a:t>Em</a:t>
+            </a:r>
+            <a:r>
+              <a:rPr lang="en-US" sz="2800" dirty="0"/>
+              <a:t> &lt;</a:t>
+            </a:r>
+            <a:r>
+              <a:rPr lang="en-US" sz="2800" dirty="0" err="1"/>
+              <a:t>em</a:t>
+            </a:r>
+            <a:r>
+              <a:rPr lang="en-US" sz="2800" dirty="0"/>
+              <a:t>&gt;&lt;/</a:t>
+            </a:r>
+            <a:r>
+              <a:rPr lang="en-US" sz="2800" dirty="0" err="1"/>
+              <a:t>em</a:t>
+            </a:r>
+            <a:r>
+              <a:rPr lang="en-US" sz="2800" dirty="0"/>
+              <a:t>&gt; - everything within has italics applied</a:t>
+            </a:r>
+          </a:p>
+          <a:p>
+            <a:pPr lvl="1"/>
+            <a:r>
+              <a:rPr lang="en-US" sz="2800" dirty="0"/>
+              <a:t>Strong &lt;strong&gt;&lt;/strong&gt; - everything within has bold applied</a:t>
+            </a:r>
+          </a:p>
+          <a:p>
+            <a:pPr lvl="1"/>
+            <a:r>
+              <a:rPr lang="en-US" sz="2800" dirty="0"/>
+              <a:t>Span &lt;span&gt;&lt;/span&gt; - everything within can have different styles applied</a:t>
+            </a:r>
+          </a:p>
+          <a:p>
+            <a:pPr lvl="1"/>
+            <a:endParaRPr lang="en-US" sz="2800" dirty="0"/>
+          </a:p>
+          <a:p>
+            <a:r>
+              <a:rPr lang="en-US" sz="3200" dirty="0"/>
+              <a:t>Common Element Attributes</a:t>
+            </a:r>
+          </a:p>
+          <a:p>
+            <a:pPr lvl="1"/>
+            <a:r>
+              <a:rPr lang="en-US" sz="2800" dirty="0"/>
+              <a:t>Id id=“xxx”</a:t>
+            </a:r>
+          </a:p>
+          <a:p>
+            <a:pPr lvl="1"/>
+            <a:r>
+              <a:rPr lang="en-US" sz="2800" dirty="0"/>
+              <a:t>Class class=“xxx”</a:t>
+            </a:r>
+          </a:p>
+          <a:p>
+            <a:endParaRPr lang="en-US" dirty="0"/>
+          </a:p>
+        </p:txBody>
+      </p:sp>
+    </p:spTree>
+    <p:extLst>
+      <p:ext uri="{BB962C8B-B14F-4D97-AF65-F5344CB8AC3E}">
+        <p14:creationId xmlns:p14="http://schemas.microsoft.com/office/powerpoint/2010/main" val="278172747"/>
       </p:ext>
     </p:extLst>
   </p:cSld>

</xml_diff>